<commit_message>
Added welcoming screen and sound
</commit_message>
<xml_diff>
--- a/DawnGuard_Hackathon_Presentation.pptx
+++ b/DawnGuard_Hackathon_Presentation.pptx
@@ -3392,6 +3392,7 @@
               </a:defRPr>
             </a:pPr>
             <a:r>
+              <a:rPr dirty="0"/>
               <a:t>🛣️ ROADMAP</a:t>
             </a:r>
           </a:p>
@@ -3695,7 +3696,7 @@
           </a:bodyPr>
           <a:lstStyle/>
           <a:p>
-            <a:pPr algn="ctr">
+            <a:pPr lvl="1" algn="ctr">
               <a:defRPr sz="4800" b="1">
                 <a:solidFill>
                   <a:srgbClr val="FF6B35"/>
@@ -3708,7 +3709,7 @@
             </a:r>
           </a:p>
           <a:p>
-            <a:pPr algn="ctr">
+            <a:pPr lvl="1" algn="ctr">
               <a:defRPr sz="4800" b="1">
                 <a:solidFill>
                   <a:srgbClr val="FF6B35"/>
@@ -3759,6 +3760,7 @@
               </a:defRPr>
             </a:pPr>
             <a:r>
+              <a:rPr dirty="0"/>
               <a:t>✅ Innovation: ZKP + Local AI + P2P + Blockchain</a:t>
             </a:r>
           </a:p>
@@ -3774,6 +3776,7 @@
               </a:defRPr>
             </a:pPr>
             <a:r>
+              <a:rPr dirty="0"/>
               <a:t>✅ Technical: Production-ready, 120KB code, real crypto</a:t>
             </a:r>
           </a:p>
@@ -3789,6 +3792,7 @@
               </a:defRPr>
             </a:pPr>
             <a:r>
+              <a:rPr dirty="0"/>
               <a:t>✅ Impact: $480 saved/year, 100% privacy, family safety</a:t>
             </a:r>
           </a:p>
@@ -3804,6 +3808,7 @@
               </a:defRPr>
             </a:pPr>
             <a:r>
+              <a:rPr dirty="0"/>
               <a:t>✅ Clarity: Replace Dropbox + ChatGPT with YOUR Black Box</a:t>
             </a:r>
           </a:p>
@@ -3839,7 +3844,16 @@
               </a:defRPr>
             </a:pPr>
             <a:r>
-              <a:t>Why DawnGuard Wins:</a:t>
+              <a:rPr dirty="0"/>
+              <a:t>Why </a:t>
+            </a:r>
+            <a:r>
+              <a:rPr dirty="0" err="1"/>
+              <a:t>DawnGuard</a:t>
+            </a:r>
+            <a:r>
+              <a:rPr dirty="0"/>
+              <a:t> Wins:</a:t>
             </a:r>
           </a:p>
           <a:p>
@@ -3851,6 +3865,7 @@
               </a:defRPr>
             </a:pPr>
             <a:r>
+              <a:rPr dirty="0"/>
               <a:t>🏆 Only family-focused privacy app | 🏆 Only local AI moderation</a:t>
             </a:r>
           </a:p>
@@ -3863,6 +3878,7 @@
               </a:defRPr>
             </a:pPr>
             <a:r>
+              <a:rPr dirty="0"/>
               <a:t>🏆 Only ZKP auth for AI | 🏆 Perfect Black Box fit</a:t>
             </a:r>
           </a:p>
@@ -3874,7 +3890,7 @@
                 </a:solidFill>
               </a:defRPr>
             </a:pPr>
-            <a:endParaRPr/>
+            <a:endParaRPr dirty="0"/>
           </a:p>
           <a:p>
             <a:pPr>
@@ -3885,6 +3901,7 @@
               </a:defRPr>
             </a:pPr>
             <a:r>
+              <a:rPr dirty="0"/>
               <a:t>One Family, One Box, Zero Compromises.</a:t>
             </a:r>
           </a:p>
@@ -4569,6 +4586,7 @@
               </a:defRPr>
             </a:pPr>
             <a:r>
+              <a:rPr dirty="0"/>
               <a:t>🔐 PRIVACY</a:t>
             </a:r>
           </a:p>
@@ -4581,6 +4599,7 @@
               </a:defRPr>
             </a:pPr>
             <a:r>
+              <a:rPr dirty="0"/>
               <a:t>• Zero-Knowledge Proof Auth</a:t>
             </a:r>
           </a:p>
@@ -4593,6 +4612,7 @@
               </a:defRPr>
             </a:pPr>
             <a:r>
+              <a:rPr dirty="0"/>
               <a:t>  First AI using ZKP</a:t>
             </a:r>
           </a:p>
@@ -4604,7 +4624,7 @@
                 </a:solidFill>
               </a:defRPr>
             </a:pPr>
-            <a:endParaRPr/>
+            <a:endParaRPr dirty="0"/>
           </a:p>
           <a:p>
             <a:pPr>
@@ -4615,6 +4635,7 @@
               </a:defRPr>
             </a:pPr>
             <a:r>
+              <a:rPr dirty="0"/>
               <a:t>• Multi-Layer Encryption</a:t>
             </a:r>
           </a:p>
@@ -4627,6 +4648,7 @@
               </a:defRPr>
             </a:pPr>
             <a:r>
+              <a:rPr dirty="0"/>
               <a:t>  5 security layers</a:t>
             </a:r>
           </a:p>
@@ -4638,7 +4660,7 @@
                 </a:solidFill>
               </a:defRPr>
             </a:pPr>
-            <a:endParaRPr/>
+            <a:endParaRPr dirty="0"/>
           </a:p>
           <a:p>
             <a:pPr>
@@ -4649,6 +4671,7 @@
               </a:defRPr>
             </a:pPr>
             <a:r>
+              <a:rPr dirty="0"/>
               <a:t>• Local AI Moderation</a:t>
             </a:r>
           </a:p>
@@ -4661,6 +4684,7 @@
               </a:defRPr>
             </a:pPr>
             <a:r>
+              <a:rPr dirty="0"/>
               <a:t>  NO competitor does this</a:t>
             </a:r>
           </a:p>
@@ -4696,6 +4720,7 @@
               </a:defRPr>
             </a:pPr>
             <a:r>
+              <a:rPr dirty="0"/>
               <a:t>🤖 AI INNOVATION</a:t>
             </a:r>
           </a:p>
@@ -4708,6 +4733,7 @@
               </a:defRPr>
             </a:pPr>
             <a:r>
+              <a:rPr dirty="0"/>
               <a:t>• Graceful Degradation</a:t>
             </a:r>
           </a:p>
@@ -4720,8 +4746,14 @@
               </a:defRPr>
             </a:pPr>
             <a:r>
-              <a:t>  Works without Ollama</a:t>
-            </a:r>
+              <a:rPr dirty="0"/>
+              <a:t>  Works without </a:t>
+            </a:r>
+            <a:r>
+              <a:rPr dirty="0" err="1"/>
+              <a:t>Ollama</a:t>
+            </a:r>
+            <a:endParaRPr dirty="0"/>
           </a:p>
           <a:p>
             <a:pPr>
@@ -4731,7 +4763,7 @@
                 </a:solidFill>
               </a:defRPr>
             </a:pPr>
-            <a:endParaRPr/>
+            <a:endParaRPr dirty="0"/>
           </a:p>
           <a:p>
             <a:pPr>
@@ -4742,6 +4774,7 @@
               </a:defRPr>
             </a:pPr>
             <a:r>
+              <a:rPr dirty="0"/>
               <a:t>• Streaming Responses</a:t>
             </a:r>
           </a:p>
@@ -4754,6 +4787,7 @@
               </a:defRPr>
             </a:pPr>
             <a:r>
+              <a:rPr dirty="0"/>
               <a:t>  Real-time chat</a:t>
             </a:r>
           </a:p>
@@ -4765,7 +4799,7 @@
                 </a:solidFill>
               </a:defRPr>
             </a:pPr>
-            <a:endParaRPr/>
+            <a:endParaRPr dirty="0"/>
           </a:p>
           <a:p>
             <a:pPr>
@@ -4776,6 +4810,7 @@
               </a:defRPr>
             </a:pPr>
             <a:r>
+              <a:rPr dirty="0"/>
               <a:t>• AI-Powered Features</a:t>
             </a:r>
           </a:p>
@@ -4788,6 +4823,7 @@
               </a:defRPr>
             </a:pPr>
             <a:r>
+              <a:rPr dirty="0"/>
               <a:t>  Smart search, tagging</a:t>
             </a:r>
           </a:p>
@@ -4823,6 +4859,7 @@
               </a:defRPr>
             </a:pPr>
             <a:r>
+              <a:rPr dirty="0"/>
               <a:t>👨‍👩‍👧‍👦 FAMILY FIRST</a:t>
             </a:r>
           </a:p>
@@ -4835,6 +4872,7 @@
               </a:defRPr>
             </a:pPr>
             <a:r>
+              <a:rPr dirty="0"/>
               <a:t>• Only for Families</a:t>
             </a:r>
           </a:p>
@@ -4847,6 +4885,7 @@
               </a:defRPr>
             </a:pPr>
             <a:r>
+              <a:rPr dirty="0"/>
               <a:t>  Not enterprise adapted</a:t>
             </a:r>
           </a:p>
@@ -4858,7 +4897,7 @@
                 </a:solidFill>
               </a:defRPr>
             </a:pPr>
-            <a:endParaRPr/>
+            <a:endParaRPr dirty="0"/>
           </a:p>
           <a:p>
             <a:pPr>
@@ -4869,6 +4908,7 @@
               </a:defRPr>
             </a:pPr>
             <a:r>
+              <a:rPr dirty="0"/>
               <a:t>• Parental Controls</a:t>
             </a:r>
           </a:p>
@@ -4881,6 +4921,7 @@
               </a:defRPr>
             </a:pPr>
             <a:r>
+              <a:rPr dirty="0"/>
               <a:t>  Activity monitoring</a:t>
             </a:r>
           </a:p>
@@ -4892,7 +4933,7 @@
                 </a:solidFill>
               </a:defRPr>
             </a:pPr>
-            <a:endParaRPr/>
+            <a:endParaRPr dirty="0"/>
           </a:p>
           <a:p>
             <a:pPr>
@@ -4903,6 +4944,7 @@
               </a:defRPr>
             </a:pPr>
             <a:r>
+              <a:rPr dirty="0"/>
               <a:t>• Storage Quotas</a:t>
             </a:r>
           </a:p>
@@ -4915,6 +4957,7 @@
               </a:defRPr>
             </a:pPr>
             <a:r>
+              <a:rPr dirty="0"/>
               <a:t>  Digital responsibility</a:t>
             </a:r>
           </a:p>
@@ -5589,6 +5632,7 @@
               </a:defRPr>
             </a:pPr>
             <a:r>
+              <a:rPr dirty="0"/>
               <a:t>🏗️ TECHNICAL ARCHITECTURE</a:t>
             </a:r>
           </a:p>
@@ -5625,6 +5669,7 @@
               </a:defRPr>
             </a:pPr>
             <a:r>
+              <a:rPr dirty="0"/>
               <a:t>┌─ YOUR BLACK BOX ─────────────┐</a:t>
             </a:r>
           </a:p>
@@ -5638,7 +5683,16 @@
               </a:defRPr>
             </a:pPr>
             <a:r>
-              <a:t>│  Django Web App ←→ Ollama AI  │</a:t>
+              <a:rPr dirty="0"/>
+              <a:t>│  Django Web App ←→ </a:t>
+            </a:r>
+            <a:r>
+              <a:rPr dirty="0" err="1"/>
+              <a:t>Ollama</a:t>
+            </a:r>
+            <a:r>
+              <a:rPr dirty="0"/>
+              <a:t> AI  │</a:t>
             </a:r>
           </a:p>
           <a:p>
@@ -5651,6 +5705,7 @@
               </a:defRPr>
             </a:pPr>
             <a:r>
+              <a:rPr dirty="0"/>
               <a:t>│         ↕                      │</a:t>
             </a:r>
           </a:p>
@@ -5664,6 +5719,7 @@
               </a:defRPr>
             </a:pPr>
             <a:r>
+              <a:rPr dirty="0"/>
               <a:t>│  Encryption Layer (AES-256)   │</a:t>
             </a:r>
           </a:p>
@@ -5677,6 +5733,7 @@
               </a:defRPr>
             </a:pPr>
             <a:r>
+              <a:rPr dirty="0"/>
               <a:t>│         ↕                      │</a:t>
             </a:r>
           </a:p>
@@ -5690,6 +5747,7 @@
               </a:defRPr>
             </a:pPr>
             <a:r>
+              <a:rPr dirty="0"/>
               <a:t>│  SQLite Database (Encrypted)  │</a:t>
             </a:r>
           </a:p>
@@ -5703,6 +5761,7 @@
               </a:defRPr>
             </a:pPr>
             <a:r>
+              <a:rPr dirty="0"/>
               <a:t>└───────────────────────────────┘</a:t>
             </a:r>
           </a:p>
@@ -5716,6 +5775,7 @@
               </a:defRPr>
             </a:pPr>
             <a:r>
+              <a:rPr dirty="0"/>
               <a:t>         ↕              ↕</a:t>
             </a:r>
           </a:p>
@@ -5729,6 +5789,7 @@
               </a:defRPr>
             </a:pPr>
             <a:r>
+              <a:rPr dirty="0"/>
               <a:t>   Solana Devnet    P2P Mesh</a:t>
             </a:r>
           </a:p>
@@ -5764,7 +5825,16 @@
               </a:defRPr>
             </a:pPr>
             <a:r>
-              <a:t>Stack: Django 5.0, Python 3.11, Ollama (Llama 3.2), Solana Devnet</a:t>
+              <a:rPr dirty="0"/>
+              <a:t>Stack: Django 5.0, Python 3.11, </a:t>
+            </a:r>
+            <a:r>
+              <a:rPr dirty="0" err="1"/>
+              <a:t>Ollama</a:t>
+            </a:r>
+            <a:r>
+              <a:rPr dirty="0"/>
+              <a:t> (Llama 3.2), Solana Devnet</a:t>
             </a:r>
           </a:p>
           <a:p>
@@ -5776,6 +5846,7 @@
               </a:defRPr>
             </a:pPr>
             <a:r>
+              <a:rPr dirty="0"/>
               <a:t>Encryption: AES-256, RSA-2048, PBKDF2 | Deploy: Docker Compose</a:t>
             </a:r>
           </a:p>
@@ -5880,6 +5951,7 @@
               </a:defRPr>
             </a:pPr>
             <a:r>
+              <a:rPr dirty="0"/>
               <a:t>🌍 REAL-WORLD IMPACT</a:t>
             </a:r>
           </a:p>
@@ -6171,6 +6243,7 @@
               </a:defRPr>
             </a:pPr>
             <a:r>
+              <a:rPr dirty="0"/>
               <a:t>🚀 PRODUCTION-READY CODE</a:t>
             </a:r>
           </a:p>
@@ -6207,6 +6280,7 @@
               </a:defRPr>
             </a:pPr>
             <a:r>
+              <a:rPr dirty="0"/>
               <a:t>One-Command Deploy:</a:t>
             </a:r>
           </a:p>
@@ -6220,8 +6294,30 @@
               </a:defRPr>
             </a:pPr>
             <a:r>
-              <a:t>$ git clone https://github.com/shariqazeem/DawnGuard.git</a:t>
-            </a:r>
+              <a:rPr dirty="0"/>
+              <a:t>$ git clone https://</a:t>
+            </a:r>
+            <a:r>
+              <a:rPr dirty="0" err="1"/>
+              <a:t>github.com</a:t>
+            </a:r>
+            <a:r>
+              <a:rPr dirty="0"/>
+              <a:t>/</a:t>
+            </a:r>
+            <a:r>
+              <a:rPr dirty="0" err="1"/>
+              <a:t>shariqazeem</a:t>
+            </a:r>
+            <a:r>
+              <a:rPr dirty="0"/>
+              <a:t>/</a:t>
+            </a:r>
+            <a:r>
+              <a:rPr dirty="0" err="1"/>
+              <a:t>DawnGuard.git</a:t>
+            </a:r>
+            <a:endParaRPr dirty="0"/>
           </a:p>
           <a:p>
             <a:pPr>
@@ -6233,8 +6329,22 @@
               </a:defRPr>
             </a:pPr>
             <a:r>
-              <a:t>$ cd DawnGuard &amp;&amp; ./scripts/setup.sh</a:t>
-            </a:r>
+              <a:rPr dirty="0"/>
+              <a:t>$ cd </a:t>
+            </a:r>
+            <a:r>
+              <a:rPr dirty="0" err="1"/>
+              <a:t>DawnGuard</a:t>
+            </a:r>
+            <a:r>
+              <a:rPr dirty="0"/>
+              <a:t> &amp;&amp; ./scripts/</a:t>
+            </a:r>
+            <a:r>
+              <a:rPr dirty="0" err="1"/>
+              <a:t>setup.sh</a:t>
+            </a:r>
+            <a:endParaRPr dirty="0"/>
           </a:p>
         </p:txBody>
       </p:sp>

</xml_diff>